<commit_message>
sales data collected and written to csv
</commit_message>
<xml_diff>
--- a/Project_Presentation.pptx
+++ b/Project_Presentation.pptx
@@ -114,6 +114,11 @@
       </a:defRPr>
     </a:lvl9pPr>
   </p:defaultTextStyle>
+  <p:extLst>
+    <p:ext uri="{EFAFB233-063F-42B5-8137-9DF3F51BA10A}">
+      <p15:sldGuideLst xmlns:p15="http://schemas.microsoft.com/office/powerpoint/2012/main"/>
+    </p:ext>
+  </p:extLst>
 </p:presentation>
 </file>
 
@@ -5977,8 +5982,134 @@
               <a:t>Note the try: except:  index error – no data for 63045</a:t>
             </a:r>
           </a:p>
-        </p:txBody>
-      </p:sp>
+          <a:p>
+            <a:r>
+              <a:rPr lang="en-US" dirty="0"/>
+              <a:t>except </a:t>
+            </a:r>
+            <a:r>
+              <a:rPr lang="en-US" dirty="0" err="1"/>
+              <a:t>IndexError</a:t>
+            </a:r>
+            <a:r>
+              <a:rPr lang="en-US" dirty="0"/>
+              <a:t>:</a:t>
+            </a:r>
+          </a:p>
+          <a:p>
+            <a:r>
+              <a:rPr lang="en-US" dirty="0"/>
+              <a:t>    print("</a:t>
+            </a:r>
+            <a:r>
+              <a:rPr lang="en-US" dirty="0" err="1"/>
+              <a:t>IndexError</a:t>
+            </a:r>
+            <a:r>
+              <a:rPr lang="en-US" dirty="0"/>
+              <a:t> on record: " + </a:t>
+            </a:r>
+            <a:r>
+              <a:rPr lang="en-US" dirty="0" err="1"/>
+              <a:t>GeoID</a:t>
+            </a:r>
+            <a:r>
+              <a:rPr lang="en-US" dirty="0"/>
+              <a:t>)</a:t>
+            </a:r>
+          </a:p>
+        </p:txBody>
+      </p:sp>
+      <p:pic>
+        <p:nvPicPr>
+          <p:cNvPr id="4" name="Picture 3">
+            <a:extLst>
+              <a:ext uri="{FF2B5EF4-FFF2-40B4-BE49-F238E27FC236}">
+                <a16:creationId xmlns:a16="http://schemas.microsoft.com/office/drawing/2014/main" id="{2AE25899-242D-4420-8F71-F3F6CBE9E23C}"/>
+              </a:ext>
+            </a:extLst>
+          </p:cNvPr>
+          <p:cNvPicPr>
+            <a:picLocks noChangeAspect="1"/>
+          </p:cNvPicPr>
+          <p:nvPr/>
+        </p:nvPicPr>
+        <p:blipFill>
+          <a:blip r:embed="rId2"/>
+          <a:stretch>
+            <a:fillRect/>
+          </a:stretch>
+        </p:blipFill>
+        <p:spPr>
+          <a:xfrm>
+            <a:off x="0" y="2271322"/>
+            <a:ext cx="12192000" cy="2315355"/>
+          </a:xfrm>
+          <a:prstGeom prst="rect">
+            <a:avLst/>
+          </a:prstGeom>
+        </p:spPr>
+      </p:pic>
+      <p:pic>
+        <p:nvPicPr>
+          <p:cNvPr id="5" name="Picture 4">
+            <a:extLst>
+              <a:ext uri="{FF2B5EF4-FFF2-40B4-BE49-F238E27FC236}">
+                <a16:creationId xmlns:a16="http://schemas.microsoft.com/office/drawing/2014/main" id="{E1F9F9AF-E425-4B28-AE84-B37AF34753AD}"/>
+              </a:ext>
+            </a:extLst>
+          </p:cNvPr>
+          <p:cNvPicPr>
+            <a:picLocks noChangeAspect="1"/>
+          </p:cNvPicPr>
+          <p:nvPr/>
+        </p:nvPicPr>
+        <p:blipFill>
+          <a:blip r:embed="rId3"/>
+          <a:stretch>
+            <a:fillRect/>
+          </a:stretch>
+        </p:blipFill>
+        <p:spPr>
+          <a:xfrm>
+            <a:off x="0" y="4872427"/>
+            <a:ext cx="7458075" cy="800100"/>
+          </a:xfrm>
+          <a:prstGeom prst="rect">
+            <a:avLst/>
+          </a:prstGeom>
+        </p:spPr>
+      </p:pic>
+      <p:pic>
+        <p:nvPicPr>
+          <p:cNvPr id="6" name="Picture 5">
+            <a:extLst>
+              <a:ext uri="{FF2B5EF4-FFF2-40B4-BE49-F238E27FC236}">
+                <a16:creationId xmlns:a16="http://schemas.microsoft.com/office/drawing/2014/main" id="{3D522A4A-23CC-4D24-8DFE-704AA8E27747}"/>
+              </a:ext>
+            </a:extLst>
+          </p:cNvPr>
+          <p:cNvPicPr>
+            <a:picLocks noChangeAspect="1"/>
+          </p:cNvPicPr>
+          <p:nvPr/>
+        </p:nvPicPr>
+        <p:blipFill>
+          <a:blip r:embed="rId4"/>
+          <a:stretch>
+            <a:fillRect/>
+          </a:stretch>
+        </p:blipFill>
+        <p:spPr>
+          <a:xfrm>
+            <a:off x="-403373" y="6172199"/>
+            <a:ext cx="5619750" cy="561975"/>
+          </a:xfrm>
+          <a:prstGeom prst="rect">
+            <a:avLst/>
+          </a:prstGeom>
+        </p:spPr>
+      </p:pic>
     </p:spTree>
     <p:extLst>
       <p:ext uri="{BB962C8B-B14F-4D97-AF65-F5344CB8AC3E}">

</xml_diff>